<commit_message>
Cleaned up project, final commit
</commit_message>
<xml_diff>
--- a/DOC/ProjectReport_SpaceSomethingOrOther.pptx
+++ b/DOC/ProjectReport_SpaceSomethingOrOther.pptx
@@ -3778,8 +3778,8 @@
         </p:nvSpPr>
         <p:spPr>
           <a:xfrm>
-            <a:off x="914401" y="1752600"/>
-            <a:ext cx="5486400" cy="4351338"/>
+            <a:off x="609600" y="1752600"/>
+            <a:ext cx="6400799" cy="4351338"/>
           </a:xfrm>
           <a:prstGeom prst="rect">
             <a:avLst/>
@@ -3891,6 +3891,7 @@
               <a:rPr lang="en-US" dirty="0"/>
               <a:t>Model parameters:</a:t>
             </a:r>
+            <a:endParaRPr lang="en-US" sz="2400" dirty="0"/>
           </a:p>
           <a:p>
             <a:pPr marL="742950" lvl="1" indent="-285750">
@@ -3937,7 +3938,7 @@
               <a:t>Softmax</a:t>
             </a:r>
             <a:r>
-              <a:rPr lang="en-US" sz="1600">
+              <a:rPr lang="en-US" sz="1600" dirty="0">
                 <a:solidFill>
                   <a:srgbClr val="202124"/>
                 </a:solidFill>
@@ -3945,7 +3946,7 @@
                   <a:srgbClr val="FFFFFF"/>
                 </a:highlight>
               </a:rPr>
-              <a:t> function</a:t>
+              <a:t> activation function used for final layer</a:t>
             </a:r>
             <a:endParaRPr lang="en-US" sz="1600" dirty="0"/>
           </a:p>
@@ -3987,8 +3988,8 @@
         </p:blipFill>
         <p:spPr>
           <a:xfrm>
-            <a:off x="7620000" y="2926152"/>
-            <a:ext cx="3238781" cy="2004234"/>
+            <a:off x="7162800" y="3048000"/>
+            <a:ext cx="4260420" cy="2636448"/>
           </a:xfrm>
           <a:prstGeom prst="rect">
             <a:avLst/>
@@ -4017,8 +4018,8 @@
         </p:blipFill>
         <p:spPr>
           <a:xfrm>
-            <a:off x="7513310" y="2514600"/>
-            <a:ext cx="3452159" cy="167655"/>
+            <a:off x="5638800" y="2438400"/>
+            <a:ext cx="6276091" cy="304800"/>
           </a:xfrm>
           <a:prstGeom prst="rect">
             <a:avLst/>
@@ -4146,8 +4147,8 @@
         </p:blipFill>
         <p:spPr>
           <a:xfrm>
-            <a:off x="1219200" y="671890"/>
-            <a:ext cx="10515600" cy="6262310"/>
+            <a:off x="1524000" y="914400"/>
+            <a:ext cx="8534400" cy="5424110"/>
           </a:xfrm>
           <a:prstGeom prst="rect">
             <a:avLst/>
@@ -4531,7 +4532,7 @@
         </p:nvSpPr>
         <p:spPr>
           <a:xfrm>
-            <a:off x="1295400" y="1981200"/>
+            <a:off x="1600200" y="1981200"/>
             <a:ext cx="7903845" cy="4351338"/>
           </a:xfrm>
           <a:prstGeom prst="rect">
@@ -4651,8 +4652,92 @@
             </a:pPr>
             <a:r>
               <a:rPr lang="en-US" sz="2400" dirty="0"/>
-              <a:t>?</a:t>
-            </a:r>
+              <a:t>Kernal = ‘</a:t>
+            </a:r>
+            <a:r>
+              <a:rPr lang="en-US" sz="2400" dirty="0" err="1"/>
+              <a:t>rfb</a:t>
+            </a:r>
+            <a:r>
+              <a:rPr lang="en-US" sz="2400" dirty="0"/>
+              <a:t>’</a:t>
+            </a:r>
+          </a:p>
+          <a:p>
+            <a:pPr marL="742950" lvl="1" indent="-285750">
+              <a:buFont typeface="Arial" panose="020B0604020202020204" pitchFamily="34" charset="0"/>
+              <a:buChar char="•"/>
+            </a:pPr>
+            <a:r>
+              <a:rPr lang="en-US" sz="2400" dirty="0"/>
+              <a:t>Gamma value = </a:t>
+            </a:r>
+            <a:r>
+              <a:rPr lang="en-US" sz="2400" b="0" i="0" dirty="0">
+                <a:solidFill>
+                  <a:srgbClr val="212529"/>
+                </a:solidFill>
+                <a:effectLst/>
+                <a:highlight>
+                  <a:srgbClr val="FFFFFF"/>
+                </a:highlight>
+                <a:latin typeface="-apple-system"/>
+              </a:rPr>
+              <a:t>1 / (</a:t>
+            </a:r>
+            <a:r>
+              <a:rPr lang="en-US" sz="2400" b="0" i="0" dirty="0" err="1">
+                <a:solidFill>
+                  <a:srgbClr val="212529"/>
+                </a:solidFill>
+                <a:effectLst/>
+                <a:highlight>
+                  <a:srgbClr val="FFFFFF"/>
+                </a:highlight>
+                <a:latin typeface="-apple-system"/>
+              </a:rPr>
+              <a:t>n_features</a:t>
+            </a:r>
+            <a:r>
+              <a:rPr lang="en-US" sz="2400" b="0" i="0" dirty="0">
+                <a:solidFill>
+                  <a:srgbClr val="212529"/>
+                </a:solidFill>
+                <a:effectLst/>
+                <a:highlight>
+                  <a:srgbClr val="FFFFFF"/>
+                </a:highlight>
+                <a:latin typeface="-apple-system"/>
+              </a:rPr>
+              <a:t> * </a:t>
+            </a:r>
+            <a:r>
+              <a:rPr lang="en-US" sz="2400" b="0" i="0" dirty="0" err="1">
+                <a:solidFill>
+                  <a:srgbClr val="212529"/>
+                </a:solidFill>
+                <a:effectLst/>
+                <a:highlight>
+                  <a:srgbClr val="FFFFFF"/>
+                </a:highlight>
+                <a:latin typeface="-apple-system"/>
+              </a:rPr>
+              <a:t>X.var</a:t>
+            </a:r>
+            <a:r>
+              <a:rPr lang="en-US" sz="2400" b="0" i="0" dirty="0">
+                <a:solidFill>
+                  <a:srgbClr val="212529"/>
+                </a:solidFill>
+                <a:effectLst/>
+                <a:highlight>
+                  <a:srgbClr val="FFFFFF"/>
+                </a:highlight>
+                <a:latin typeface="-apple-system"/>
+              </a:rPr>
+              <a:t>())</a:t>
+            </a:r>
+            <a:endParaRPr lang="en-US" sz="2400" dirty="0"/>
           </a:p>
           <a:p>
             <a:pPr marL="742950" lvl="1" indent="-285750">

</xml_diff>